<commit_message>
makes first drafts of plots
</commit_message>
<xml_diff>
--- a/final_plots.pptx
+++ b/final_plots.pptx
@@ -5,7 +5,12 @@
     <p:sldMasterId id="2147483660" r:id="rId1"/>
   </p:sldMasterIdLst>
   <p:sldIdLst>
-    <p:sldId id="256" r:id="rId2"/>
+    <p:sldId id="259" r:id="rId2"/>
+    <p:sldId id="260" r:id="rId3"/>
+    <p:sldId id="261" r:id="rId4"/>
+    <p:sldId id="257" r:id="rId5"/>
+    <p:sldId id="258" r:id="rId6"/>
+    <p:sldId id="256" r:id="rId7"/>
   </p:sldIdLst>
   <p:sldSz cx="7315200" cy="10058400"/>
   <p:notesSz cx="6858000" cy="9144000"/>
@@ -2966,6 +2971,614 @@
           <a:chExt cx="0" cy="0"/>
         </a:xfrm>
       </p:grpSpPr>
+      <p:pic>
+        <p:nvPicPr>
+          <p:cNvPr id="8" name="Picture 7">
+            <a:extLst>
+              <a:ext uri="{FF2B5EF4-FFF2-40B4-BE49-F238E27FC236}">
+                <a16:creationId xmlns:a16="http://schemas.microsoft.com/office/drawing/2014/main" id="{12588CA3-136F-9CE1-FBE1-B0187C6AF598}"/>
+              </a:ext>
+            </a:extLst>
+          </p:cNvPr>
+          <p:cNvPicPr>
+            <a:picLocks noChangeAspect="1"/>
+          </p:cNvPicPr>
+          <p:nvPr/>
+        </p:nvPicPr>
+        <p:blipFill>
+          <a:blip r:embed="rId2"/>
+          <a:stretch>
+            <a:fillRect/>
+          </a:stretch>
+        </p:blipFill>
+        <p:spPr>
+          <a:xfrm>
+            <a:off x="1631950" y="2148416"/>
+            <a:ext cx="4447574" cy="5786029"/>
+          </a:xfrm>
+          <a:prstGeom prst="rect">
+            <a:avLst/>
+          </a:prstGeom>
+        </p:spPr>
+      </p:pic>
+      <p:pic>
+        <p:nvPicPr>
+          <p:cNvPr id="5" name="Picture 4">
+            <a:extLst>
+              <a:ext uri="{FF2B5EF4-FFF2-40B4-BE49-F238E27FC236}">
+                <a16:creationId xmlns:a16="http://schemas.microsoft.com/office/drawing/2014/main" id="{4A70B17A-E74D-CE3B-F26F-77B16D33F98B}"/>
+              </a:ext>
+            </a:extLst>
+          </p:cNvPr>
+          <p:cNvPicPr>
+            <a:picLocks noChangeAspect="1"/>
+          </p:cNvPicPr>
+          <p:nvPr/>
+        </p:nvPicPr>
+        <p:blipFill>
+          <a:blip r:embed="rId3"/>
+          <a:stretch>
+            <a:fillRect/>
+          </a:stretch>
+        </p:blipFill>
+        <p:spPr>
+          <a:xfrm>
+            <a:off x="3584613" y="2299993"/>
+            <a:ext cx="2383704" cy="2274110"/>
+          </a:xfrm>
+          <a:prstGeom prst="rect">
+            <a:avLst/>
+          </a:prstGeom>
+        </p:spPr>
+      </p:pic>
+      <p:pic>
+        <p:nvPicPr>
+          <p:cNvPr id="7" name="Picture 6">
+            <a:extLst>
+              <a:ext uri="{FF2B5EF4-FFF2-40B4-BE49-F238E27FC236}">
+                <a16:creationId xmlns:a16="http://schemas.microsoft.com/office/drawing/2014/main" id="{D7AAB75B-E0C5-3695-14A3-6EFE7A3FB4DA}"/>
+              </a:ext>
+            </a:extLst>
+          </p:cNvPr>
+          <p:cNvPicPr>
+            <a:picLocks noChangeAspect="1"/>
+          </p:cNvPicPr>
+          <p:nvPr/>
+        </p:nvPicPr>
+        <p:blipFill>
+          <a:blip r:embed="rId4"/>
+          <a:stretch>
+            <a:fillRect/>
+          </a:stretch>
+        </p:blipFill>
+        <p:spPr>
+          <a:xfrm>
+            <a:off x="3584613" y="4645658"/>
+            <a:ext cx="2383704" cy="1831689"/>
+          </a:xfrm>
+          <a:prstGeom prst="rect">
+            <a:avLst/>
+          </a:prstGeom>
+        </p:spPr>
+      </p:pic>
+      <p:cxnSp>
+        <p:nvCxnSpPr>
+          <p:cNvPr id="10" name="Straight Connector 9">
+            <a:extLst>
+              <a:ext uri="{FF2B5EF4-FFF2-40B4-BE49-F238E27FC236}">
+                <a16:creationId xmlns:a16="http://schemas.microsoft.com/office/drawing/2014/main" id="{E3B873F1-1E3C-5403-D18E-9CC417DC831B}"/>
+              </a:ext>
+            </a:extLst>
+          </p:cNvPr>
+          <p:cNvCxnSpPr>
+            <a:cxnSpLocks/>
+          </p:cNvCxnSpPr>
+          <p:nvPr/>
+        </p:nvCxnSpPr>
+        <p:spPr>
+          <a:xfrm flipV="1">
+            <a:off x="2730843" y="2299993"/>
+            <a:ext cx="853770" cy="2076884"/>
+          </a:xfrm>
+          <a:prstGeom prst="line">
+            <a:avLst/>
+          </a:prstGeom>
+          <a:ln w="25400">
+            <a:solidFill>
+              <a:schemeClr val="tx1"/>
+            </a:solidFill>
+            <a:prstDash val="dash"/>
+          </a:ln>
+        </p:spPr>
+        <p:style>
+          <a:lnRef idx="1">
+            <a:schemeClr val="accent1"/>
+          </a:lnRef>
+          <a:fillRef idx="0">
+            <a:schemeClr val="accent1"/>
+          </a:fillRef>
+          <a:effectRef idx="0">
+            <a:schemeClr val="accent1"/>
+          </a:effectRef>
+          <a:fontRef idx="minor">
+            <a:schemeClr val="tx1"/>
+          </a:fontRef>
+        </p:style>
+      </p:cxnSp>
+      <p:cxnSp>
+        <p:nvCxnSpPr>
+          <p:cNvPr id="11" name="Straight Connector 10">
+            <a:extLst>
+              <a:ext uri="{FF2B5EF4-FFF2-40B4-BE49-F238E27FC236}">
+                <a16:creationId xmlns:a16="http://schemas.microsoft.com/office/drawing/2014/main" id="{8356E991-1FC7-8185-AFA0-2DCB5FF215D6}"/>
+              </a:ext>
+            </a:extLst>
+          </p:cNvPr>
+          <p:cNvCxnSpPr>
+            <a:cxnSpLocks/>
+          </p:cNvCxnSpPr>
+          <p:nvPr/>
+        </p:nvCxnSpPr>
+        <p:spPr>
+          <a:xfrm flipH="1" flipV="1">
+            <a:off x="2730843" y="4448432"/>
+            <a:ext cx="853770" cy="125671"/>
+          </a:xfrm>
+          <a:prstGeom prst="line">
+            <a:avLst/>
+          </a:prstGeom>
+          <a:ln w="25400">
+            <a:solidFill>
+              <a:schemeClr val="tx1"/>
+            </a:solidFill>
+            <a:prstDash val="dash"/>
+          </a:ln>
+        </p:spPr>
+        <p:style>
+          <a:lnRef idx="1">
+            <a:schemeClr val="accent1"/>
+          </a:lnRef>
+          <a:fillRef idx="0">
+            <a:schemeClr val="accent1"/>
+          </a:fillRef>
+          <a:effectRef idx="0">
+            <a:schemeClr val="accent1"/>
+          </a:effectRef>
+          <a:fontRef idx="minor">
+            <a:schemeClr val="tx1"/>
+          </a:fontRef>
+        </p:style>
+      </p:cxnSp>
+    </p:spTree>
+    <p:extLst>
+      <p:ext uri="{BB962C8B-B14F-4D97-AF65-F5344CB8AC3E}">
+        <p14:creationId xmlns:p14="http://schemas.microsoft.com/office/powerpoint/2010/main" val="92002573"/>
+      </p:ext>
+    </p:extLst>
+  </p:cSld>
+  <p:clrMapOvr>
+    <a:masterClrMapping/>
+  </p:clrMapOvr>
+</p:sld>
+</file>
+
+<file path=ppt/slides/slide2.xml><?xml version="1.0" encoding="utf-8"?>
+<p:sld xmlns:a="http://schemas.openxmlformats.org/drawingml/2006/main" xmlns:r="http://schemas.openxmlformats.org/officeDocument/2006/relationships" xmlns:p="http://schemas.openxmlformats.org/presentationml/2006/main">
+  <p:cSld>
+    <p:spTree>
+      <p:nvGrpSpPr>
+        <p:cNvPr id="1" name=""/>
+        <p:cNvGrpSpPr/>
+        <p:nvPr/>
+      </p:nvGrpSpPr>
+      <p:grpSpPr>
+        <a:xfrm>
+          <a:off x="0" y="0"/>
+          <a:ext cx="0" cy="0"/>
+          <a:chOff x="0" y="0"/>
+          <a:chExt cx="0" cy="0"/>
+        </a:xfrm>
+      </p:grpSpPr>
+      <p:pic>
+        <p:nvPicPr>
+          <p:cNvPr id="4" name="Picture 3">
+            <a:extLst>
+              <a:ext uri="{FF2B5EF4-FFF2-40B4-BE49-F238E27FC236}">
+                <a16:creationId xmlns:a16="http://schemas.microsoft.com/office/drawing/2014/main" id="{4A51EEA9-3B13-0638-F457-9CA87D2F4B07}"/>
+              </a:ext>
+            </a:extLst>
+          </p:cNvPr>
+          <p:cNvPicPr>
+            <a:picLocks noChangeAspect="1"/>
+          </p:cNvPicPr>
+          <p:nvPr/>
+        </p:nvPicPr>
+        <p:blipFill>
+          <a:blip r:embed="rId2"/>
+          <a:stretch>
+            <a:fillRect/>
+          </a:stretch>
+        </p:blipFill>
+        <p:spPr>
+          <a:xfrm>
+            <a:off x="642551" y="3621891"/>
+            <a:ext cx="6030097" cy="2814618"/>
+          </a:xfrm>
+          <a:prstGeom prst="rect">
+            <a:avLst/>
+          </a:prstGeom>
+        </p:spPr>
+      </p:pic>
+    </p:spTree>
+    <p:extLst>
+      <p:ext uri="{BB962C8B-B14F-4D97-AF65-F5344CB8AC3E}">
+        <p14:creationId xmlns:p14="http://schemas.microsoft.com/office/powerpoint/2010/main" val="1172640887"/>
+      </p:ext>
+    </p:extLst>
+  </p:cSld>
+  <p:clrMapOvr>
+    <a:masterClrMapping/>
+  </p:clrMapOvr>
+</p:sld>
+</file>
+
+<file path=ppt/slides/slide3.xml><?xml version="1.0" encoding="utf-8"?>
+<p:sld xmlns:a="http://schemas.openxmlformats.org/drawingml/2006/main" xmlns:r="http://schemas.openxmlformats.org/officeDocument/2006/relationships" xmlns:p="http://schemas.openxmlformats.org/presentationml/2006/main">
+  <p:cSld>
+    <p:spTree>
+      <p:nvGrpSpPr>
+        <p:cNvPr id="1" name=""/>
+        <p:cNvGrpSpPr/>
+        <p:nvPr/>
+      </p:nvGrpSpPr>
+      <p:grpSpPr>
+        <a:xfrm>
+          <a:off x="0" y="0"/>
+          <a:ext cx="0" cy="0"/>
+          <a:chOff x="0" y="0"/>
+          <a:chExt cx="0" cy="0"/>
+        </a:xfrm>
+      </p:grpSpPr>
+      <p:pic>
+        <p:nvPicPr>
+          <p:cNvPr id="4" name="Picture 3">
+            <a:extLst>
+              <a:ext uri="{FF2B5EF4-FFF2-40B4-BE49-F238E27FC236}">
+                <a16:creationId xmlns:a16="http://schemas.microsoft.com/office/drawing/2014/main" id="{E62481F9-A94C-F9E1-EB15-7047CB78EEBE}"/>
+              </a:ext>
+            </a:extLst>
+          </p:cNvPr>
+          <p:cNvPicPr>
+            <a:picLocks noChangeAspect="1"/>
+          </p:cNvPicPr>
+          <p:nvPr/>
+        </p:nvPicPr>
+        <p:blipFill>
+          <a:blip r:embed="rId2"/>
+          <a:stretch>
+            <a:fillRect/>
+          </a:stretch>
+        </p:blipFill>
+        <p:spPr>
+          <a:xfrm>
+            <a:off x="482600" y="2647950"/>
+            <a:ext cx="6350000" cy="4762500"/>
+          </a:xfrm>
+          <a:prstGeom prst="rect">
+            <a:avLst/>
+          </a:prstGeom>
+        </p:spPr>
+      </p:pic>
+    </p:spTree>
+    <p:extLst>
+      <p:ext uri="{BB962C8B-B14F-4D97-AF65-F5344CB8AC3E}">
+        <p14:creationId xmlns:p14="http://schemas.microsoft.com/office/powerpoint/2010/main" val="2669888380"/>
+      </p:ext>
+    </p:extLst>
+  </p:cSld>
+  <p:clrMapOvr>
+    <a:masterClrMapping/>
+  </p:clrMapOvr>
+</p:sld>
+</file>
+
+<file path=ppt/slides/slide4.xml><?xml version="1.0" encoding="utf-8"?>
+<p:sld xmlns:a="http://schemas.openxmlformats.org/drawingml/2006/main" xmlns:r="http://schemas.openxmlformats.org/officeDocument/2006/relationships" xmlns:p="http://schemas.openxmlformats.org/presentationml/2006/main">
+  <p:cSld>
+    <p:spTree>
+      <p:nvGrpSpPr>
+        <p:cNvPr id="1" name=""/>
+        <p:cNvGrpSpPr/>
+        <p:nvPr/>
+      </p:nvGrpSpPr>
+      <p:grpSpPr>
+        <a:xfrm>
+          <a:off x="0" y="0"/>
+          <a:ext cx="0" cy="0"/>
+          <a:chOff x="0" y="0"/>
+          <a:chExt cx="0" cy="0"/>
+        </a:xfrm>
+      </p:grpSpPr>
+      <p:pic>
+        <p:nvPicPr>
+          <p:cNvPr id="4" name="Picture 3">
+            <a:extLst>
+              <a:ext uri="{FF2B5EF4-FFF2-40B4-BE49-F238E27FC236}">
+                <a16:creationId xmlns:a16="http://schemas.microsoft.com/office/drawing/2014/main" id="{41796BF9-00B1-14A6-0D15-DC121AA8BC85}"/>
+              </a:ext>
+            </a:extLst>
+          </p:cNvPr>
+          <p:cNvPicPr>
+            <a:picLocks noChangeAspect="1"/>
+          </p:cNvPicPr>
+          <p:nvPr/>
+        </p:nvPicPr>
+        <p:blipFill>
+          <a:blip r:embed="rId2"/>
+          <a:stretch>
+            <a:fillRect/>
+          </a:stretch>
+        </p:blipFill>
+        <p:spPr>
+          <a:xfrm>
+            <a:off x="0" y="4419600"/>
+            <a:ext cx="7315200" cy="5486400"/>
+          </a:xfrm>
+          <a:prstGeom prst="rect">
+            <a:avLst/>
+          </a:prstGeom>
+        </p:spPr>
+      </p:pic>
+      <p:pic>
+        <p:nvPicPr>
+          <p:cNvPr id="5" name="Picture 4">
+            <a:extLst>
+              <a:ext uri="{FF2B5EF4-FFF2-40B4-BE49-F238E27FC236}">
+                <a16:creationId xmlns:a16="http://schemas.microsoft.com/office/drawing/2014/main" id="{2EBEC792-8E8D-D7D3-88B4-8C1019FEAA4D}"/>
+              </a:ext>
+            </a:extLst>
+          </p:cNvPr>
+          <p:cNvPicPr>
+            <a:picLocks noChangeAspect="1"/>
+          </p:cNvPicPr>
+          <p:nvPr/>
+        </p:nvPicPr>
+        <p:blipFill>
+          <a:blip r:embed="rId3"/>
+          <a:stretch>
+            <a:fillRect/>
+          </a:stretch>
+        </p:blipFill>
+        <p:spPr>
+          <a:xfrm>
+            <a:off x="0" y="1981200"/>
+            <a:ext cx="7315200" cy="2438400"/>
+          </a:xfrm>
+          <a:prstGeom prst="rect">
+            <a:avLst/>
+          </a:prstGeom>
+        </p:spPr>
+      </p:pic>
+      <p:sp>
+        <p:nvSpPr>
+          <p:cNvPr id="6" name="TextBox 5">
+            <a:extLst>
+              <a:ext uri="{FF2B5EF4-FFF2-40B4-BE49-F238E27FC236}">
+                <a16:creationId xmlns:a16="http://schemas.microsoft.com/office/drawing/2014/main" id="{3F4C6ED6-1542-EB88-7AE1-BCC0596EB67E}"/>
+              </a:ext>
+            </a:extLst>
+          </p:cNvPr>
+          <p:cNvSpPr txBox="1"/>
+          <p:nvPr/>
+        </p:nvSpPr>
+        <p:spPr>
+          <a:xfrm>
+            <a:off x="1819628" y="577334"/>
+            <a:ext cx="3675943" cy="369332"/>
+          </a:xfrm>
+          <a:prstGeom prst="rect">
+            <a:avLst/>
+          </a:prstGeom>
+          <a:noFill/>
+        </p:spPr>
+        <p:txBody>
+          <a:bodyPr wrap="none" rtlCol="0">
+            <a:spAutoFit/>
+          </a:bodyPr>
+          <a:lstStyle/>
+          <a:p>
+            <a:r>
+              <a:rPr lang="en-US" dirty="0"/>
+              <a:t>Comparison of All waves in all depths</a:t>
+            </a:r>
+          </a:p>
+        </p:txBody>
+      </p:sp>
+    </p:spTree>
+    <p:extLst>
+      <p:ext uri="{BB962C8B-B14F-4D97-AF65-F5344CB8AC3E}">
+        <p14:creationId xmlns:p14="http://schemas.microsoft.com/office/powerpoint/2010/main" val="1652135900"/>
+      </p:ext>
+    </p:extLst>
+  </p:cSld>
+  <p:clrMapOvr>
+    <a:masterClrMapping/>
+  </p:clrMapOvr>
+</p:sld>
+</file>
+
+<file path=ppt/slides/slide5.xml><?xml version="1.0" encoding="utf-8"?>
+<p:sld xmlns:a="http://schemas.openxmlformats.org/drawingml/2006/main" xmlns:r="http://schemas.openxmlformats.org/officeDocument/2006/relationships" xmlns:p="http://schemas.openxmlformats.org/presentationml/2006/main">
+  <p:cSld>
+    <p:spTree>
+      <p:nvGrpSpPr>
+        <p:cNvPr id="1" name=""/>
+        <p:cNvGrpSpPr/>
+        <p:nvPr/>
+      </p:nvGrpSpPr>
+      <p:grpSpPr>
+        <a:xfrm>
+          <a:off x="0" y="0"/>
+          <a:ext cx="0" cy="0"/>
+          <a:chOff x="0" y="0"/>
+          <a:chExt cx="0" cy="0"/>
+        </a:xfrm>
+      </p:grpSpPr>
+      <p:pic>
+        <p:nvPicPr>
+          <p:cNvPr id="4" name="Picture 3">
+            <a:extLst>
+              <a:ext uri="{FF2B5EF4-FFF2-40B4-BE49-F238E27FC236}">
+                <a16:creationId xmlns:a16="http://schemas.microsoft.com/office/drawing/2014/main" id="{81B482DB-E4D1-CED8-03C1-CF537BFEBB16}"/>
+              </a:ext>
+            </a:extLst>
+          </p:cNvPr>
+          <p:cNvPicPr>
+            <a:picLocks noChangeAspect="1"/>
+          </p:cNvPicPr>
+          <p:nvPr/>
+        </p:nvPicPr>
+        <p:blipFill>
+          <a:blip r:embed="rId2"/>
+          <a:stretch>
+            <a:fillRect/>
+          </a:stretch>
+        </p:blipFill>
+        <p:spPr>
+          <a:xfrm>
+            <a:off x="0" y="3004457"/>
+            <a:ext cx="7315200" cy="5486400"/>
+          </a:xfrm>
+          <a:prstGeom prst="rect">
+            <a:avLst/>
+          </a:prstGeom>
+        </p:spPr>
+      </p:pic>
+      <p:pic>
+        <p:nvPicPr>
+          <p:cNvPr id="5" name="Picture 4">
+            <a:extLst>
+              <a:ext uri="{FF2B5EF4-FFF2-40B4-BE49-F238E27FC236}">
+                <a16:creationId xmlns:a16="http://schemas.microsoft.com/office/drawing/2014/main" id="{5C0C96D7-681D-4F1C-4682-752FEDC91D01}"/>
+              </a:ext>
+            </a:extLst>
+          </p:cNvPr>
+          <p:cNvPicPr>
+            <a:picLocks noChangeAspect="1"/>
+          </p:cNvPicPr>
+          <p:nvPr/>
+        </p:nvPicPr>
+        <p:blipFill>
+          <a:blip r:embed="rId3"/>
+          <a:stretch>
+            <a:fillRect/>
+          </a:stretch>
+        </p:blipFill>
+        <p:spPr>
+          <a:xfrm>
+            <a:off x="0" y="566057"/>
+            <a:ext cx="7315200" cy="2438400"/>
+          </a:xfrm>
+          <a:prstGeom prst="rect">
+            <a:avLst/>
+          </a:prstGeom>
+        </p:spPr>
+      </p:pic>
+      <p:sp>
+        <p:nvSpPr>
+          <p:cNvPr id="6" name="TextBox 5">
+            <a:extLst>
+              <a:ext uri="{FF2B5EF4-FFF2-40B4-BE49-F238E27FC236}">
+                <a16:creationId xmlns:a16="http://schemas.microsoft.com/office/drawing/2014/main" id="{207CD3F1-A3E4-D534-D403-7BE273538385}"/>
+              </a:ext>
+            </a:extLst>
+          </p:cNvPr>
+          <p:cNvSpPr txBox="1"/>
+          <p:nvPr/>
+        </p:nvSpPr>
+        <p:spPr>
+          <a:xfrm>
+            <a:off x="2106386" y="293914"/>
+            <a:ext cx="3706143" cy="369332"/>
+          </a:xfrm>
+          <a:prstGeom prst="rect">
+            <a:avLst/>
+          </a:prstGeom>
+          <a:noFill/>
+        </p:spPr>
+        <p:txBody>
+          <a:bodyPr wrap="none" rtlCol="0">
+            <a:spAutoFit/>
+          </a:bodyPr>
+          <a:lstStyle/>
+          <a:p>
+            <a:r>
+              <a:rPr lang="en-US" dirty="0"/>
+              <a:t>Comparison of only waves 4-5 meters</a:t>
+            </a:r>
+          </a:p>
+        </p:txBody>
+      </p:sp>
+    </p:spTree>
+    <p:extLst>
+      <p:ext uri="{BB962C8B-B14F-4D97-AF65-F5344CB8AC3E}">
+        <p14:creationId xmlns:p14="http://schemas.microsoft.com/office/powerpoint/2010/main" val="1111986913"/>
+      </p:ext>
+    </p:extLst>
+  </p:cSld>
+  <p:clrMapOvr>
+    <a:masterClrMapping/>
+  </p:clrMapOvr>
+</p:sld>
+</file>
+
+<file path=ppt/slides/slide6.xml><?xml version="1.0" encoding="utf-8"?>
+<p:sld xmlns:a="http://schemas.openxmlformats.org/drawingml/2006/main" xmlns:r="http://schemas.openxmlformats.org/officeDocument/2006/relationships" xmlns:p="http://schemas.openxmlformats.org/presentationml/2006/main">
+  <p:cSld>
+    <p:spTree>
+      <p:nvGrpSpPr>
+        <p:cNvPr id="1" name=""/>
+        <p:cNvGrpSpPr/>
+        <p:nvPr/>
+      </p:nvGrpSpPr>
+      <p:grpSpPr>
+        <a:xfrm>
+          <a:off x="0" y="0"/>
+          <a:ext cx="0" cy="0"/>
+          <a:chOff x="0" y="0"/>
+          <a:chExt cx="0" cy="0"/>
+        </a:xfrm>
+      </p:grpSpPr>
+      <p:pic>
+        <p:nvPicPr>
+          <p:cNvPr id="4" name="Picture 3">
+            <a:extLst>
+              <a:ext uri="{FF2B5EF4-FFF2-40B4-BE49-F238E27FC236}">
+                <a16:creationId xmlns:a16="http://schemas.microsoft.com/office/drawing/2014/main" id="{FC7F11EB-4F82-108B-9DE6-BAC5EA9EAAC6}"/>
+              </a:ext>
+            </a:extLst>
+          </p:cNvPr>
+          <p:cNvPicPr>
+            <a:picLocks noChangeAspect="1"/>
+          </p:cNvPicPr>
+          <p:nvPr/>
+        </p:nvPicPr>
+        <p:blipFill>
+          <a:blip r:embed="rId2"/>
+          <a:stretch>
+            <a:fillRect/>
+          </a:stretch>
+        </p:blipFill>
+        <p:spPr>
+          <a:xfrm>
+            <a:off x="0" y="1371600"/>
+            <a:ext cx="7315200" cy="7315200"/>
+          </a:xfrm>
+          <a:prstGeom prst="rect">
+            <a:avLst/>
+          </a:prstGeom>
+        </p:spPr>
+      </p:pic>
     </p:spTree>
     <p:extLst>
       <p:ext uri="{BB962C8B-B14F-4D97-AF65-F5344CB8AC3E}">

</xml_diff>